<commit_message>
minor update to factsheets
</commit_message>
<xml_diff>
--- a/documentation/factsheets/WNTR_data_factsheet.pptx
+++ b/documentation/factsheets/WNTR_data_factsheet.pptx
@@ -199,46 +199,6 @@
 </pc:chgInfo>
 </file>
 
-<file path=ppt/comments/modernComment_101_217BAB4E.xml><?xml version="1.0" encoding="utf-8"?>
-<p188:cmLst xmlns:a="http://schemas.openxmlformats.org/drawingml/2006/main" xmlns:r="http://schemas.openxmlformats.org/officeDocument/2006/relationships" xmlns:p188="http://schemas.microsoft.com/office/powerpoint/2018/8/main">
-  <p188:cm id="{9FF7DED2-A667-4EC3-952B-864B9B0FA816}" authorId="{C68F20BD-5FE6-94EC-7D02-7E480943A96B}" created="2024-12-16T18:47:15.085">
-    <ac:txMkLst xmlns:ac="http://schemas.microsoft.com/office/drawing/2013/main/command">
-      <pc:docMk xmlns:pc="http://schemas.microsoft.com/office/powerpoint/2013/main/command"/>
-      <pc:sldMk xmlns:pc="http://schemas.microsoft.com/office/powerpoint/2013/main/command" cId="561752910" sldId="257"/>
-      <ac:spMk id="39" creationId="{00000000-0000-0000-0000-000000000000}"/>
-      <ac:txMk cp="580" len="64">
-        <ac:context len="646" hash="1266994117"/>
-      </ac:txMk>
-    </ac:txMkLst>
-    <p188:pos x="4070350" y="1790700"/>
-    <p188:replyLst>
-      <p188:reply id="{D7E29FE4-B00C-4D74-A929-DEF75DCBA766}" authorId="{C68F20BD-5FE6-94EC-7D02-7E480943A96B}" created="2024-12-16T18:56:35.020">
-        <p188:txBody>
-          <a:bodyPr/>
-          <a:lstStyle/>
-          <a:p>
-            <a:r>
-              <a:rPr lang="en-US"/>
-              <a:t>Add link to WNTR documentation page on the water network model.</a:t>
-            </a:r>
-          </a:p>
-        </p188:txBody>
-      </p188:reply>
-    </p188:replyLst>
-    <p188:txBody>
-      <a:bodyPr/>
-      <a:lstStyle/>
-      <a:p>
-        <a:r>
-          <a:rPr lang="en-US"/>
-          <a:t>Could not find this presentation</a:t>
-        </a:r>
-      </a:p>
-    </p188:txBody>
-  </p188:cm>
-</p188:cmLst>
-</file>
-
 <file path=ppt/slideLayouts/slideLayout1.xml><?xml version="1.0" encoding="utf-8"?>
 <p:sldLayout xmlns:a="http://schemas.openxmlformats.org/drawingml/2006/main" xmlns:r="http://schemas.openxmlformats.org/officeDocument/2006/relationships" xmlns:p="http://schemas.openxmlformats.org/presentationml/2006/main" type="title" preserve="1">
   <p:cSld name="Title Slide">
@@ -370,7 +330,7 @@
           <a:p>
             <a:fld id="{78AFBD30-E760-4572-B462-738943907F1A}" type="datetimeFigureOut">
               <a:rPr lang="en-US" smtClean="0"/>
-              <a:t>1/6/2025</a:t>
+              <a:t>3/5/2025</a:t>
             </a:fld>
             <a:endParaRPr lang="en-US"/>
           </a:p>
@@ -540,7 +500,7 @@
           <a:p>
             <a:fld id="{78AFBD30-E760-4572-B462-738943907F1A}" type="datetimeFigureOut">
               <a:rPr lang="en-US" smtClean="0"/>
-              <a:t>1/6/2025</a:t>
+              <a:t>3/5/2025</a:t>
             </a:fld>
             <a:endParaRPr lang="en-US"/>
           </a:p>
@@ -720,7 +680,7 @@
           <a:p>
             <a:fld id="{78AFBD30-E760-4572-B462-738943907F1A}" type="datetimeFigureOut">
               <a:rPr lang="en-US" smtClean="0"/>
-              <a:t>1/6/2025</a:t>
+              <a:t>3/5/2025</a:t>
             </a:fld>
             <a:endParaRPr lang="en-US"/>
           </a:p>
@@ -890,7 +850,7 @@
           <a:p>
             <a:fld id="{78AFBD30-E760-4572-B462-738943907F1A}" type="datetimeFigureOut">
               <a:rPr lang="en-US" smtClean="0"/>
-              <a:t>1/6/2025</a:t>
+              <a:t>3/5/2025</a:t>
             </a:fld>
             <a:endParaRPr lang="en-US"/>
           </a:p>
@@ -1134,7 +1094,7 @@
           <a:p>
             <a:fld id="{78AFBD30-E760-4572-B462-738943907F1A}" type="datetimeFigureOut">
               <a:rPr lang="en-US" smtClean="0"/>
-              <a:t>1/6/2025</a:t>
+              <a:t>3/5/2025</a:t>
             </a:fld>
             <a:endParaRPr lang="en-US"/>
           </a:p>
@@ -1366,7 +1326,7 @@
           <a:p>
             <a:fld id="{78AFBD30-E760-4572-B462-738943907F1A}" type="datetimeFigureOut">
               <a:rPr lang="en-US" smtClean="0"/>
-              <a:t>1/6/2025</a:t>
+              <a:t>3/5/2025</a:t>
             </a:fld>
             <a:endParaRPr lang="en-US"/>
           </a:p>
@@ -1733,7 +1693,7 @@
           <a:p>
             <a:fld id="{78AFBD30-E760-4572-B462-738943907F1A}" type="datetimeFigureOut">
               <a:rPr lang="en-US" smtClean="0"/>
-              <a:t>1/6/2025</a:t>
+              <a:t>3/5/2025</a:t>
             </a:fld>
             <a:endParaRPr lang="en-US"/>
           </a:p>
@@ -1851,7 +1811,7 @@
           <a:p>
             <a:fld id="{78AFBD30-E760-4572-B462-738943907F1A}" type="datetimeFigureOut">
               <a:rPr lang="en-US" smtClean="0"/>
-              <a:t>1/6/2025</a:t>
+              <a:t>3/5/2025</a:t>
             </a:fld>
             <a:endParaRPr lang="en-US"/>
           </a:p>
@@ -1946,7 +1906,7 @@
           <a:p>
             <a:fld id="{78AFBD30-E760-4572-B462-738943907F1A}" type="datetimeFigureOut">
               <a:rPr lang="en-US" smtClean="0"/>
-              <a:t>1/6/2025</a:t>
+              <a:t>3/5/2025</a:t>
             </a:fld>
             <a:endParaRPr lang="en-US"/>
           </a:p>
@@ -2223,7 +2183,7 @@
           <a:p>
             <a:fld id="{78AFBD30-E760-4572-B462-738943907F1A}" type="datetimeFigureOut">
               <a:rPr lang="en-US" smtClean="0"/>
-              <a:t>1/6/2025</a:t>
+              <a:t>3/5/2025</a:t>
             </a:fld>
             <a:endParaRPr lang="en-US"/>
           </a:p>
@@ -2480,7 +2440,7 @@
           <a:p>
             <a:fld id="{78AFBD30-E760-4572-B462-738943907F1A}" type="datetimeFigureOut">
               <a:rPr lang="en-US" smtClean="0"/>
-              <a:t>1/6/2025</a:t>
+              <a:t>3/5/2025</a:t>
             </a:fld>
             <a:endParaRPr lang="en-US"/>
           </a:p>
@@ -2693,7 +2653,7 @@
           <a:p>
             <a:fld id="{78AFBD30-E760-4572-B462-738943907F1A}" type="datetimeFigureOut">
               <a:rPr lang="en-US" smtClean="0"/>
-              <a:t>1/6/2025</a:t>
+              <a:t>3/5/2025</a:t>
             </a:fld>
             <a:endParaRPr lang="en-US"/>
           </a:p>
@@ -3264,8 +3224,16 @@
           <a:lstStyle/>
           <a:p>
             <a:r>
+              <a:rPr lang="en-US" sz="1100" dirty="0"/>
+              <a:t>The </a:t>
+            </a:r>
+            <a:r>
+              <a:rPr lang="en-US" sz="1100" b="1" dirty="0"/>
+              <a:t>Water Network Tool for Resilience (WNTR)</a:t>
+            </a:r>
+            <a:r>
               <a:rPr lang="en-US" sz="1150" dirty="0"/>
-              <a:t>WNTR requires a model of the water distribution system. That model can be obtained from the water utility (in EPANET INP or related file format) or be generated from data.  The basic features of the model are shown in Figure 1 and briefly described in Table 1. Some information can be approximated from publicly available data sources, as outlined in the table. Models should be calibrated to replicate system operations.</a:t>
+              <a:t> requires a model of the water distribution system. That model can be obtained from the water utility (in EPANET INP or related file format) or be generated from data.  The basic features of the model are shown in Figure 1 and briefly described in Table 1. Some information can be approximated from publicly available data sources, as outlined in the table. Models should be calibrated to replicate system operations.</a:t>
             </a:r>
           </a:p>
           <a:p>
@@ -3275,26 +3243,36 @@
             <a:r>
               <a:rPr lang="en-US" sz="1150" dirty="0"/>
               <a:t>For more information on water distribution system models, see the </a:t>
+            </a:r>
+            <a:r>
+              <a:rPr lang="en-US" sz="1150" dirty="0">
+                <a:hlinkClick r:id="rId2"/>
+              </a:rPr>
+              <a:t>EPANET 2.2 online user manual</a:t>
+            </a:r>
+            <a:r>
+              <a:rPr lang="en-US" sz="1150" dirty="0"/>
+              <a:t>, EPA’s website on </a:t>
             </a:r>
             <a:r>
               <a:rPr lang="en-US" sz="1150" dirty="0">
                 <a:hlinkClick r:id="rId3"/>
               </a:rPr>
-              <a:t>EPANET 2.2 online user manual</a:t>
+              <a:t>Small System Challenges and Solutions</a:t>
             </a:r>
             <a:r>
               <a:rPr lang="en-US" sz="1150" dirty="0"/>
-              <a:t>, and EPA’s website on </a:t>
+              <a:t>, and </a:t>
             </a:r>
             <a:r>
               <a:rPr lang="en-US" sz="1150" dirty="0">
                 <a:hlinkClick r:id="rId4"/>
               </a:rPr>
-              <a:t>Small System Challenges and Solutions</a:t>
+              <a:t>WNTR documentation </a:t>
             </a:r>
             <a:r>
               <a:rPr lang="en-US" sz="1150" dirty="0"/>
-              <a:t>. The 2020 presentation includes an overview of hydraulic modeling.</a:t>
+              <a:t>on water network models.</a:t>
             </a:r>
           </a:p>
         </p:txBody>
@@ -3910,8 +3888,8 @@
         </p:nvSpPr>
         <p:spPr>
           <a:xfrm>
-            <a:off x="196843" y="2948387"/>
-            <a:ext cx="5938777" cy="249684"/>
+            <a:off x="196843" y="2939243"/>
+            <a:ext cx="5938777" cy="273280"/>
           </a:xfrm>
           <a:prstGeom prst="rect">
             <a:avLst/>
@@ -3936,7 +3914,7 @@
               </a:spcAft>
             </a:pPr>
             <a:r>
-              <a:rPr lang="en-US" sz="1000" b="1" dirty="0">
+              <a:rPr lang="en-US" sz="1100" b="1" dirty="0">
                 <a:effectLst/>
                 <a:latin typeface="Calibri" panose="020F0502020204030204" pitchFamily="34" charset="0"/>
                 <a:ea typeface="Calibri" panose="020F0502020204030204" pitchFamily="34" charset="0"/>
@@ -3944,7 +3922,7 @@
               </a:rPr>
               <a:t>Table 1: Water distribution system model data requirements</a:t>
             </a:r>
-            <a:endParaRPr lang="en-US" sz="1000" dirty="0">
+            <a:endParaRPr lang="en-US" sz="1100" dirty="0">
               <a:effectLst/>
               <a:latin typeface="Calibri" panose="020F0502020204030204" pitchFamily="34" charset="0"/>
               <a:ea typeface="Calibri" panose="020F0502020204030204" pitchFamily="34" charset="0"/>
@@ -3968,14 +3946,14 @@
           <p:nvPr>
             <p:extLst>
               <p:ext uri="{D42A27DB-BD31-4B8C-83A1-F6EECF244321}">
-                <p14:modId xmlns:p14="http://schemas.microsoft.com/office/powerpoint/2010/main" val="1903847199"/>
+                <p14:modId xmlns:p14="http://schemas.microsoft.com/office/powerpoint/2010/main" val="94069854"/>
               </p:ext>
             </p:extLst>
           </p:nvPr>
         </p:nvGraphicFramePr>
         <p:xfrm>
           <a:off x="237669" y="3179522"/>
-          <a:ext cx="7207746" cy="6214947"/>
+          <a:ext cx="7207746" cy="6350368"/>
         </p:xfrm>
         <a:graphic>
           <a:graphicData uri="http://schemas.openxmlformats.org/drawingml/2006/table">
@@ -4327,11 +4305,29 @@
                         <a:buChar char="-"/>
                       </a:pPr>
                       <a:r>
-                        <a:rPr lang="en-US" sz="900">
+                        <a:rPr lang="en-US" sz="900" dirty="0">
                           <a:effectLst/>
                         </a:rPr>
                         <a:t>Location*</a:t>
                       </a:r>
+                    </a:p>
+                    <a:p>
+                      <a:pPr marL="171450" marR="0" lvl="0" indent="-171450">
+                        <a:lnSpc>
+                          <a:spcPct val="107000"/>
+                        </a:lnSpc>
+                        <a:spcBef>
+                          <a:spcPts val="0"/>
+                        </a:spcBef>
+                        <a:spcAft>
+                          <a:spcPts val="0"/>
+                        </a:spcAft>
+                        <a:buFont typeface="Calibri"/>
+                        <a:buChar char="-"/>
+                      </a:pPr>
+                      <a:endParaRPr lang="en-US" sz="900" dirty="0">
+                        <a:effectLst/>
+                      </a:endParaRPr>
                     </a:p>
                     <a:p>
                       <a:pPr lvl="0" algn="l">
@@ -4347,13 +4343,13 @@
                         <a:buNone/>
                       </a:pPr>
                       <a:r>
-                        <a:rPr lang="en-US" sz="900" b="0" i="0" u="none" strike="noStrike" noProof="0">
+                        <a:rPr lang="en-US" sz="900" b="0" i="0" u="none" strike="noStrike" noProof="0" dirty="0">
                           <a:effectLst/>
                           <a:latin typeface="Calibri"/>
                         </a:rPr>
                         <a:t>* Location for all components</a:t>
                       </a:r>
-                      <a:endParaRPr lang="en-US"/>
+                      <a:endParaRPr lang="en-US" dirty="0"/>
                     </a:p>
                     <a:p>
                       <a:pPr lvl="0" algn="l">
@@ -4369,13 +4365,13 @@
                         <a:buNone/>
                       </a:pPr>
                       <a:r>
-                        <a:rPr lang="en-US" sz="900" b="0" i="0" u="none" strike="noStrike" noProof="0">
+                        <a:rPr lang="en-US" sz="900" b="0" i="0" u="none" strike="noStrike" noProof="0" dirty="0">
                           <a:effectLst/>
                           <a:latin typeface="Calibri"/>
                         </a:rPr>
                         <a:t>includes the X and Y position along</a:t>
                       </a:r>
-                      <a:endParaRPr lang="en-US"/>
+                      <a:endParaRPr lang="en-US" dirty="0"/>
                     </a:p>
                     <a:p>
                       <a:pPr lvl="0" algn="l">
@@ -4391,13 +4387,13 @@
                         <a:buNone/>
                       </a:pPr>
                       <a:r>
-                        <a:rPr lang="en-US" sz="900" b="0" i="0" u="none" strike="noStrike" noProof="0">
+                        <a:rPr lang="en-US" sz="900" b="0" i="0" u="none" strike="noStrike" noProof="0" dirty="0">
                           <a:effectLst/>
                           <a:latin typeface="Calibri"/>
                         </a:rPr>
                         <a:t>with elevation. X and Y can be in</a:t>
                       </a:r>
-                      <a:endParaRPr lang="en-US"/>
+                      <a:endParaRPr lang="en-US" dirty="0"/>
                     </a:p>
                     <a:p>
                       <a:pPr lvl="0" algn="l">
@@ -4413,13 +4409,13 @@
                         <a:buNone/>
                       </a:pPr>
                       <a:r>
-                        <a:rPr lang="en-US" sz="900" b="0" i="0" u="none" strike="noStrike" noProof="0">
+                        <a:rPr lang="en-US" sz="900" b="0" i="0" u="none" strike="noStrike" noProof="0" dirty="0">
                           <a:effectLst/>
                           <a:latin typeface="Calibri"/>
                         </a:rPr>
                         <a:t>any coordinate system. WNTR uses</a:t>
                       </a:r>
-                      <a:endParaRPr lang="en-US"/>
+                      <a:endParaRPr lang="en-US" dirty="0"/>
                     </a:p>
                     <a:p>
                       <a:pPr marL="0" marR="0" lvl="0" indent="0">
@@ -4435,13 +4431,13 @@
                         <a:buNone/>
                       </a:pPr>
                       <a:r>
-                        <a:rPr lang="en-US" sz="900" b="0" i="0" u="none" strike="noStrike" noProof="0">
+                        <a:rPr lang="en-US" sz="900" b="0" i="0" u="none" strike="noStrike" noProof="0" dirty="0">
                           <a:effectLst/>
                           <a:latin typeface="Calibri"/>
                         </a:rPr>
                         <a:t>SI units for all other attributes.</a:t>
                       </a:r>
-                      <a:endParaRPr lang="en-US"/>
+                      <a:endParaRPr lang="en-US" dirty="0"/>
                     </a:p>
                     <a:p>
                       <a:pPr marL="0" marR="0" lvl="0" indent="0">
@@ -4929,7 +4925,7 @@
                         <a:rPr lang="en-US" sz="900" dirty="0">
                           <a:effectLst/>
                         </a:rPr>
-                        <a:t>Pressure</a:t>
+                        <a:t>Hydraulic head (elevation + water pressure)</a:t>
                       </a:r>
                       <a:endParaRPr lang="en-US" sz="900" dirty="0">
                         <a:effectLst/>
@@ -4961,7 +4957,7 @@
                         <a:rPr lang="en-US" sz="900" dirty="0">
                           <a:effectLst/>
                         </a:rPr>
-                        <a:t>Location is generally known or can be estimated using online maps of the region. Pressure can be estimated if needed.</a:t>
+                        <a:t>Location is generally known or can be estimated using online maps of the region. Hydraulic head can be estimated if needed.</a:t>
                       </a:r>
                       <a:endParaRPr lang="en-US" sz="900" dirty="0">
                         <a:effectLst/>
@@ -5553,7 +5549,7 @@
                         <a:rPr lang="en-US" sz="900" dirty="0">
                           <a:effectLst/>
                         </a:rPr>
-                        <a:t>Operational settings (pump curve)</a:t>
+                        <a:t>Operational settings (pump curve or constant power)</a:t>
                       </a:r>
                     </a:p>
                     <a:p>
@@ -5866,16 +5862,10 @@
                         </a:spcAft>
                       </a:pPr>
                       <a:r>
-                        <a:rPr lang="en-US" sz="900">
-                          <a:effectLst/>
-                        </a:rPr>
-                        <a:t>Valve attributes are difficult to </a:t>
-                      </a:r>
-                      <a:r>
                         <a:rPr lang="en-US" sz="900" dirty="0">
                           <a:effectLst/>
                         </a:rPr>
-                        <a:t>approximate without guidance from the utility.</a:t>
+                        <a:t>Valve attributes are difficult to approximate without guidance from the utility.</a:t>
                       </a:r>
                       <a:endParaRPr lang="en-US" sz="900" dirty="0">
                         <a:effectLst/>
@@ -6217,11 +6207,6 @@
   <p:clrMapOvr>
     <a:masterClrMapping/>
   </p:clrMapOvr>
-  <p:extLst>
-    <p:ext uri="{6950BFC3-D8DA-4A85-94F7-54DA5524770B}">
-      <p188:commentRel xmlns:p188="http://schemas.microsoft.com/office/powerpoint/2018/8/main" r:id="rId2"/>
-    </p:ext>
-  </p:extLst>
 </p:sld>
 </file>
 
@@ -6487,19 +6472,15 @@
 </file>
 
 <file path=customXml/item1.xml><?xml version="1.0" encoding="utf-8"?>
-<p:properties xmlns:p="http://schemas.microsoft.com/office/2006/metadata/properties" xmlns:xsi="http://www.w3.org/2001/XMLSchema-instance" xmlns:pc="http://schemas.microsoft.com/office/infopath/2007/PartnerControls">
-  <documentManagement/>
-</p:properties>
+<?mso-contentType ?>
+<FormTemplates xmlns="http://schemas.microsoft.com/sharepoint/v3/contenttype/forms">
+  <Display>DocumentLibraryForm</Display>
+  <Edit>DocumentLibraryForm</Edit>
+  <New>DocumentLibraryForm</New>
+</FormTemplates>
 </file>
 
 <file path=customXml/item2.xml><?xml version="1.0" encoding="utf-8"?>
-<EsriMapsInfo xmlns="ESRI.ArcGIS.Mapping.OfficeIntegration.PowerPointInfo">
-  <Version>Version1</Version>
-  <RequiresSignIn>False</RequiresSignIn>
-</EsriMapsInfo>
-</file>
-
-<file path=customXml/item3.xml><?xml version="1.0" encoding="utf-8"?>
 <ct:contentTypeSchema xmlns:ct="http://schemas.microsoft.com/office/2006/metadata/contentType" xmlns:ma="http://schemas.microsoft.com/office/2006/metadata/properties/metaAttributes" ct:_="" ma:_="" ma:contentTypeName="Document" ma:contentTypeID="0x010100AC28686FBD4338489595DD7413329EE0" ma:contentTypeVersion="10" ma:contentTypeDescription="Create a new document." ma:contentTypeScope="" ma:versionID="efe20889d221db7351fa9f9f793f0500">
   <xsd:schema xmlns:xsd="http://www.w3.org/2001/XMLSchema" xmlns:xs="http://www.w3.org/2001/XMLSchema" xmlns:p="http://schemas.microsoft.com/office/2006/metadata/properties" xmlns:ns2="d50414f6-37ad-4088-828c-17732dfcb590" xmlns:ns3="b6537b32-d7a3-445d-a13e-f5ee99b6d44a" targetNamespace="http://schemas.microsoft.com/office/2006/metadata/properties" ma:root="true" ma:fieldsID="b74ad9af483442c1d01e11d21c2dc391" ns2:_="" ns3:_="">
     <xsd:import namespace="d50414f6-37ad-4088-828c-17732dfcb590"/>
@@ -6702,33 +6683,28 @@
 </ct:contentTypeSchema>
 </file>
 
+<file path=customXml/item3.xml><?xml version="1.0" encoding="utf-8"?>
+<EsriMapsInfo xmlns="ESRI.ArcGIS.Mapping.OfficeIntegration.PowerPointInfo">
+  <Version>Version1</Version>
+  <RequiresSignIn>False</RequiresSignIn>
+</EsriMapsInfo>
+</file>
+
 <file path=customXml/item4.xml><?xml version="1.0" encoding="utf-8"?>
-<?mso-contentType ?>
-<FormTemplates xmlns="http://schemas.microsoft.com/sharepoint/v3/contenttype/forms">
-  <Display>DocumentLibraryForm</Display>
-  <Edit>DocumentLibraryForm</Edit>
-  <New>DocumentLibraryForm</New>
-</FormTemplates>
+<p:properties xmlns:p="http://schemas.microsoft.com/office/2006/metadata/properties" xmlns:xsi="http://www.w3.org/2001/XMLSchema-instance" xmlns:pc="http://schemas.microsoft.com/office/infopath/2007/PartnerControls">
+  <documentManagement/>
+</p:properties>
 </file>
 
 <file path=customXml/itemProps1.xml><?xml version="1.0" encoding="utf-8"?>
-<ds:datastoreItem xmlns:ds="http://schemas.openxmlformats.org/officeDocument/2006/customXml" ds:itemID="{87EEA8EA-CF32-4E0D-BB38-A6DB78C5956B}">
+<ds:datastoreItem xmlns:ds="http://schemas.openxmlformats.org/officeDocument/2006/customXml" ds:itemID="{0AB2FE3E-3E7D-44DB-95E4-344B8C623AF1}">
   <ds:schemaRefs>
-    <ds:schemaRef ds:uri="http://schemas.microsoft.com/office/2006/metadata/properties"/>
-    <ds:schemaRef ds:uri="http://schemas.microsoft.com/office/infopath/2007/PartnerControls"/>
+    <ds:schemaRef ds:uri="http://schemas.microsoft.com/sharepoint/v3/contenttype/forms"/>
   </ds:schemaRefs>
 </ds:datastoreItem>
 </file>
 
 <file path=customXml/itemProps2.xml><?xml version="1.0" encoding="utf-8"?>
-<ds:datastoreItem xmlns:ds="http://schemas.openxmlformats.org/officeDocument/2006/customXml" ds:itemID="{F820E9AF-8DED-4D17-80AC-2052DB1506D3}">
-  <ds:schemaRefs>
-    <ds:schemaRef ds:uri="ESRI.ArcGIS.Mapping.OfficeIntegration.PowerPointInfo"/>
-  </ds:schemaRefs>
-</ds:datastoreItem>
-</file>
-
-<file path=customXml/itemProps3.xml><?xml version="1.0" encoding="utf-8"?>
 <ds:datastoreItem xmlns:ds="http://schemas.openxmlformats.org/officeDocument/2006/customXml" ds:itemID="{9D45BE62-2CB4-4E53-B087-95042FB170BE}">
   <ds:schemaRefs>
     <ds:schemaRef ds:uri="http://schemas.microsoft.com/office/2006/metadata/contentType"/>
@@ -6747,10 +6723,19 @@
 </ds:datastoreItem>
 </file>
 
+<file path=customXml/itemProps3.xml><?xml version="1.0" encoding="utf-8"?>
+<ds:datastoreItem xmlns:ds="http://schemas.openxmlformats.org/officeDocument/2006/customXml" ds:itemID="{F820E9AF-8DED-4D17-80AC-2052DB1506D3}">
+  <ds:schemaRefs>
+    <ds:schemaRef ds:uri="ESRI.ArcGIS.Mapping.OfficeIntegration.PowerPointInfo"/>
+  </ds:schemaRefs>
+</ds:datastoreItem>
+</file>
+
 <file path=customXml/itemProps4.xml><?xml version="1.0" encoding="utf-8"?>
-<ds:datastoreItem xmlns:ds="http://schemas.openxmlformats.org/officeDocument/2006/customXml" ds:itemID="{0AB2FE3E-3E7D-44DB-95E4-344B8C623AF1}">
+<ds:datastoreItem xmlns:ds="http://schemas.openxmlformats.org/officeDocument/2006/customXml" ds:itemID="{87EEA8EA-CF32-4E0D-BB38-A6DB78C5956B}">
   <ds:schemaRefs>
-    <ds:schemaRef ds:uri="http://schemas.microsoft.com/sharepoint/v3/contenttype/forms"/>
+    <ds:schemaRef ds:uri="http://schemas.microsoft.com/office/2006/metadata/properties"/>
+    <ds:schemaRef ds:uri="http://schemas.microsoft.com/office/infopath/2007/PartnerControls"/>
   </ds:schemaRefs>
 </ds:datastoreItem>
 </file>
</xml_diff>